<commit_message>
Itération sur les wireframes et creation du modele UML de la BD et du MPD
</commit_message>
<xml_diff>
--- a/analyse/Wireframes.pptx
+++ b/analyse/Wireframes.pptx
@@ -295,7 +295,8 @@
           <a:p>
             <a:fld id="{49211E1D-1FB6-46FD-AF96-A4F932C7C19E}" type="datetimeFigureOut">
               <a:rPr lang="fr-FR" smtClean="0"/>
-              <a:t>04/06/2018</a:t>
+              <a:pPr/>
+              <a:t>05/06/2018</a:t>
             </a:fld>
             <a:endParaRPr lang="fr-FR"/>
           </a:p>
@@ -337,6 +338,7 @@
           <a:p>
             <a:fld id="{8E8E9598-5F10-4853-9A0D-6F018B00CC54}" type="slidenum">
               <a:rPr lang="fr-FR" smtClean="0"/>
+              <a:pPr/>
               <a:t>‹Nr.›</a:t>
             </a:fld>
             <a:endParaRPr lang="fr-FR"/>
@@ -460,7 +462,8 @@
           <a:p>
             <a:fld id="{49211E1D-1FB6-46FD-AF96-A4F932C7C19E}" type="datetimeFigureOut">
               <a:rPr lang="fr-FR" smtClean="0"/>
-              <a:t>04/06/2018</a:t>
+              <a:pPr/>
+              <a:t>05/06/2018</a:t>
             </a:fld>
             <a:endParaRPr lang="fr-FR"/>
           </a:p>
@@ -502,6 +505,7 @@
           <a:p>
             <a:fld id="{8E8E9598-5F10-4853-9A0D-6F018B00CC54}" type="slidenum">
               <a:rPr lang="fr-FR" smtClean="0"/>
+              <a:pPr/>
               <a:t>‹Nr.›</a:t>
             </a:fld>
             <a:endParaRPr lang="fr-FR"/>
@@ -635,7 +639,8 @@
           <a:p>
             <a:fld id="{49211E1D-1FB6-46FD-AF96-A4F932C7C19E}" type="datetimeFigureOut">
               <a:rPr lang="fr-FR" smtClean="0"/>
-              <a:t>04/06/2018</a:t>
+              <a:pPr/>
+              <a:t>05/06/2018</a:t>
             </a:fld>
             <a:endParaRPr lang="fr-FR"/>
           </a:p>
@@ -677,6 +682,7 @@
           <a:p>
             <a:fld id="{8E8E9598-5F10-4853-9A0D-6F018B00CC54}" type="slidenum">
               <a:rPr lang="fr-FR" smtClean="0"/>
+              <a:pPr/>
               <a:t>‹Nr.›</a:t>
             </a:fld>
             <a:endParaRPr lang="fr-FR"/>
@@ -800,7 +806,8 @@
           <a:p>
             <a:fld id="{49211E1D-1FB6-46FD-AF96-A4F932C7C19E}" type="datetimeFigureOut">
               <a:rPr lang="fr-FR" smtClean="0"/>
-              <a:t>04/06/2018</a:t>
+              <a:pPr/>
+              <a:t>05/06/2018</a:t>
             </a:fld>
             <a:endParaRPr lang="fr-FR"/>
           </a:p>
@@ -842,6 +849,7 @@
           <a:p>
             <a:fld id="{8E8E9598-5F10-4853-9A0D-6F018B00CC54}" type="slidenum">
               <a:rPr lang="fr-FR" smtClean="0"/>
+              <a:pPr/>
               <a:t>‹Nr.›</a:t>
             </a:fld>
             <a:endParaRPr lang="fr-FR"/>
@@ -1041,7 +1049,8 @@
           <a:p>
             <a:fld id="{49211E1D-1FB6-46FD-AF96-A4F932C7C19E}" type="datetimeFigureOut">
               <a:rPr lang="fr-FR" smtClean="0"/>
-              <a:t>04/06/2018</a:t>
+              <a:pPr/>
+              <a:t>05/06/2018</a:t>
             </a:fld>
             <a:endParaRPr lang="fr-FR"/>
           </a:p>
@@ -1083,6 +1092,7 @@
           <a:p>
             <a:fld id="{8E8E9598-5F10-4853-9A0D-6F018B00CC54}" type="slidenum">
               <a:rPr lang="fr-FR" smtClean="0"/>
+              <a:pPr/>
               <a:t>‹Nr.›</a:t>
             </a:fld>
             <a:endParaRPr lang="fr-FR"/>
@@ -1324,7 +1334,8 @@
           <a:p>
             <a:fld id="{49211E1D-1FB6-46FD-AF96-A4F932C7C19E}" type="datetimeFigureOut">
               <a:rPr lang="fr-FR" smtClean="0"/>
-              <a:t>04/06/2018</a:t>
+              <a:pPr/>
+              <a:t>05/06/2018</a:t>
             </a:fld>
             <a:endParaRPr lang="fr-FR"/>
           </a:p>
@@ -1366,6 +1377,7 @@
           <a:p>
             <a:fld id="{8E8E9598-5F10-4853-9A0D-6F018B00CC54}" type="slidenum">
               <a:rPr lang="fr-FR" smtClean="0"/>
+              <a:pPr/>
               <a:t>‹Nr.›</a:t>
             </a:fld>
             <a:endParaRPr lang="fr-FR"/>
@@ -1741,7 +1753,8 @@
           <a:p>
             <a:fld id="{49211E1D-1FB6-46FD-AF96-A4F932C7C19E}" type="datetimeFigureOut">
               <a:rPr lang="fr-FR" smtClean="0"/>
-              <a:t>04/06/2018</a:t>
+              <a:pPr/>
+              <a:t>05/06/2018</a:t>
             </a:fld>
             <a:endParaRPr lang="fr-FR"/>
           </a:p>
@@ -1783,6 +1796,7 @@
           <a:p>
             <a:fld id="{8E8E9598-5F10-4853-9A0D-6F018B00CC54}" type="slidenum">
               <a:rPr lang="fr-FR" smtClean="0"/>
+              <a:pPr/>
               <a:t>‹Nr.›</a:t>
             </a:fld>
             <a:endParaRPr lang="fr-FR"/>
@@ -1854,7 +1868,8 @@
           <a:p>
             <a:fld id="{49211E1D-1FB6-46FD-AF96-A4F932C7C19E}" type="datetimeFigureOut">
               <a:rPr lang="fr-FR" smtClean="0"/>
-              <a:t>04/06/2018</a:t>
+              <a:pPr/>
+              <a:t>05/06/2018</a:t>
             </a:fld>
             <a:endParaRPr lang="fr-FR"/>
           </a:p>
@@ -1896,6 +1911,7 @@
           <a:p>
             <a:fld id="{8E8E9598-5F10-4853-9A0D-6F018B00CC54}" type="slidenum">
               <a:rPr lang="fr-FR" smtClean="0"/>
+              <a:pPr/>
               <a:t>‹Nr.›</a:t>
             </a:fld>
             <a:endParaRPr lang="fr-FR"/>
@@ -1944,7 +1960,8 @@
           <a:p>
             <a:fld id="{49211E1D-1FB6-46FD-AF96-A4F932C7C19E}" type="datetimeFigureOut">
               <a:rPr lang="fr-FR" smtClean="0"/>
-              <a:t>04/06/2018</a:t>
+              <a:pPr/>
+              <a:t>05/06/2018</a:t>
             </a:fld>
             <a:endParaRPr lang="fr-FR"/>
           </a:p>
@@ -1986,6 +2003,7 @@
           <a:p>
             <a:fld id="{8E8E9598-5F10-4853-9A0D-6F018B00CC54}" type="slidenum">
               <a:rPr lang="fr-FR" smtClean="0"/>
+              <a:pPr/>
               <a:t>‹Nr.›</a:t>
             </a:fld>
             <a:endParaRPr lang="fr-FR"/>
@@ -2216,7 +2234,8 @@
           <a:p>
             <a:fld id="{49211E1D-1FB6-46FD-AF96-A4F932C7C19E}" type="datetimeFigureOut">
               <a:rPr lang="fr-FR" smtClean="0"/>
-              <a:t>04/06/2018</a:t>
+              <a:pPr/>
+              <a:t>05/06/2018</a:t>
             </a:fld>
             <a:endParaRPr lang="fr-FR"/>
           </a:p>
@@ -2258,6 +2277,7 @@
           <a:p>
             <a:fld id="{8E8E9598-5F10-4853-9A0D-6F018B00CC54}" type="slidenum">
               <a:rPr lang="fr-FR" smtClean="0"/>
+              <a:pPr/>
               <a:t>‹Nr.›</a:t>
             </a:fld>
             <a:endParaRPr lang="fr-FR"/>
@@ -2464,7 +2484,8 @@
           <a:p>
             <a:fld id="{49211E1D-1FB6-46FD-AF96-A4F932C7C19E}" type="datetimeFigureOut">
               <a:rPr lang="fr-FR" smtClean="0"/>
-              <a:t>04/06/2018</a:t>
+              <a:pPr/>
+              <a:t>05/06/2018</a:t>
             </a:fld>
             <a:endParaRPr lang="fr-FR"/>
           </a:p>
@@ -2506,6 +2527,7 @@
           <a:p>
             <a:fld id="{8E8E9598-5F10-4853-9A0D-6F018B00CC54}" type="slidenum">
               <a:rPr lang="fr-FR" smtClean="0"/>
+              <a:pPr/>
               <a:t>‹Nr.›</a:t>
             </a:fld>
             <a:endParaRPr lang="fr-FR"/>
@@ -2672,7 +2694,8 @@
           <a:p>
             <a:fld id="{49211E1D-1FB6-46FD-AF96-A4F932C7C19E}" type="datetimeFigureOut">
               <a:rPr lang="fr-FR" smtClean="0"/>
-              <a:t>04/06/2018</a:t>
+              <a:pPr/>
+              <a:t>05/06/2018</a:t>
             </a:fld>
             <a:endParaRPr lang="fr-FR"/>
           </a:p>
@@ -2750,6 +2773,7 @@
           <a:p>
             <a:fld id="{8E8E9598-5F10-4853-9A0D-6F018B00CC54}" type="slidenum">
               <a:rPr lang="fr-FR" smtClean="0"/>
+              <a:pPr/>
               <a:t>‹Nr.›</a:t>
             </a:fld>
             <a:endParaRPr lang="fr-FR"/>
@@ -5035,7 +5059,7 @@
         <p:spPr>
           <a:xfrm>
             <a:off x="107504" y="620688"/>
-            <a:ext cx="8928992" cy="1368152"/>
+            <a:ext cx="8928992" cy="936104"/>
           </a:xfrm>
           <a:prstGeom prst="rect">
             <a:avLst/>
@@ -5153,7 +5177,7 @@
         </p:nvSpPr>
         <p:spPr>
           <a:xfrm>
-            <a:off x="3419872" y="1124744"/>
+            <a:off x="1763688" y="1124744"/>
             <a:ext cx="860557" cy="338554"/>
           </a:xfrm>
           <a:prstGeom prst="rect">
@@ -5183,7 +5207,7 @@
         </p:nvSpPr>
         <p:spPr>
           <a:xfrm>
-            <a:off x="6948264" y="1124744"/>
+            <a:off x="5292080" y="1124744"/>
             <a:ext cx="883575" cy="338554"/>
           </a:xfrm>
           <a:prstGeom prst="rect">
@@ -5213,7 +5237,7 @@
         </p:nvSpPr>
         <p:spPr>
           <a:xfrm>
-            <a:off x="5220072" y="1124744"/>
+            <a:off x="3563888" y="1124744"/>
             <a:ext cx="797526" cy="338554"/>
           </a:xfrm>
           <a:prstGeom prst="rect">
@@ -5286,7 +5310,7 @@
         </p:nvGrpSpPr>
         <p:grpSpPr>
           <a:xfrm>
-            <a:off x="5940152" y="1124744"/>
+            <a:off x="4283968" y="1124744"/>
             <a:ext cx="1008112" cy="288032"/>
             <a:chOff x="4788024" y="1772816"/>
             <a:chExt cx="1008112" cy="288032"/>
@@ -5419,7 +5443,7 @@
         </p:nvSpPr>
         <p:spPr>
           <a:xfrm>
-            <a:off x="4211960" y="1124744"/>
+            <a:off x="2555776" y="1124744"/>
             <a:ext cx="1008112" cy="288032"/>
           </a:xfrm>
           <a:prstGeom prst="rect">
@@ -5462,7 +5486,7 @@
         </p:nvGrpSpPr>
         <p:grpSpPr>
           <a:xfrm>
-            <a:off x="7812360" y="1124744"/>
+            <a:off x="6156176" y="1124744"/>
             <a:ext cx="1008112" cy="288032"/>
             <a:chOff x="4788024" y="1772816"/>
             <a:chExt cx="1008112" cy="288032"/>
@@ -5595,7 +5619,7 @@
         </p:nvSpPr>
         <p:spPr>
           <a:xfrm>
-            <a:off x="107504" y="2376264"/>
+            <a:off x="107504" y="1916832"/>
             <a:ext cx="8928992" cy="3501008"/>
           </a:xfrm>
           <a:prstGeom prst="rect">
@@ -5645,7 +5669,7 @@
         </p:nvSpPr>
         <p:spPr>
           <a:xfrm>
-            <a:off x="107504" y="2016224"/>
+            <a:off x="107504" y="1556792"/>
             <a:ext cx="1656184" cy="369332"/>
           </a:xfrm>
           <a:prstGeom prst="rect">
@@ -5675,7 +5699,7 @@
         </p:nvSpPr>
         <p:spPr>
           <a:xfrm>
-            <a:off x="1187624" y="2448272"/>
+            <a:off x="1187624" y="1988840"/>
             <a:ext cx="7704856" cy="923330"/>
           </a:xfrm>
           <a:prstGeom prst="rect">
@@ -5723,7 +5747,6 @@
               <a:rPr lang="fr-FR" i="1" dirty="0" smtClean="0"/>
               <a:t>XXX-X-XXXX-XXXX-X</a:t>
             </a:r>
-            <a:endParaRPr lang="fr-FR" i="1" dirty="0" smtClean="0"/>
           </a:p>
           <a:p>
             <a:r>
@@ -5743,78 +5766,6 @@
               <a:t>Xxxxx</a:t>
             </a:r>
             <a:endParaRPr lang="fr-FR" dirty="0" smtClean="0"/>
-          </a:p>
-        </p:txBody>
-      </p:sp>
-      <p:sp>
-        <p:nvSpPr>
-          <p:cNvPr id="36" name="Rechteck 35"/>
-          <p:cNvSpPr/>
-          <p:nvPr/>
-        </p:nvSpPr>
-        <p:spPr>
-          <a:xfrm>
-            <a:off x="1763688" y="1124744"/>
-            <a:ext cx="704039" cy="338554"/>
-          </a:xfrm>
-          <a:prstGeom prst="rect">
-            <a:avLst/>
-          </a:prstGeom>
-        </p:spPr>
-        <p:txBody>
-          <a:bodyPr wrap="none">
-            <a:spAutoFit/>
-          </a:bodyPr>
-          <a:lstStyle/>
-          <a:p>
-            <a:r>
-              <a:rPr lang="fr-FR" sz="1600" dirty="0" smtClean="0"/>
-              <a:t>Série :</a:t>
-            </a:r>
-            <a:endParaRPr lang="fr-FR" sz="1600" dirty="0"/>
-          </a:p>
-        </p:txBody>
-      </p:sp>
-      <p:sp>
-        <p:nvSpPr>
-          <p:cNvPr id="37" name="Rechteck 36"/>
-          <p:cNvSpPr/>
-          <p:nvPr/>
-        </p:nvSpPr>
-        <p:spPr>
-          <a:xfrm>
-            <a:off x="2411760" y="1124744"/>
-            <a:ext cx="1008112" cy="288032"/>
-          </a:xfrm>
-          <a:prstGeom prst="rect">
-            <a:avLst/>
-          </a:prstGeom>
-          <a:solidFill>
-            <a:schemeClr val="bg1"/>
-          </a:solidFill>
-        </p:spPr>
-        <p:style>
-          <a:lnRef idx="2">
-            <a:schemeClr val="accent1">
-              <a:shade val="50000"/>
-            </a:schemeClr>
-          </a:lnRef>
-          <a:fillRef idx="1">
-            <a:schemeClr val="accent1"/>
-          </a:fillRef>
-          <a:effectRef idx="0">
-            <a:schemeClr val="accent1"/>
-          </a:effectRef>
-          <a:fontRef idx="minor">
-            <a:schemeClr val="lt1"/>
-          </a:fontRef>
-        </p:style>
-        <p:txBody>
-          <a:bodyPr rtlCol="0" anchor="ctr"/>
-          <a:lstStyle/>
-          <a:p>
-            <a:pPr algn="ctr"/>
-            <a:endParaRPr lang="fr-FR"/>
           </a:p>
         </p:txBody>
       </p:sp>
@@ -5826,7 +5777,7 @@
         </p:nvGrpSpPr>
         <p:grpSpPr>
           <a:xfrm>
-            <a:off x="323528" y="2448272"/>
+            <a:off x="323528" y="1988840"/>
             <a:ext cx="720080" cy="1080120"/>
             <a:chOff x="251520" y="2276872"/>
             <a:chExt cx="1296144" cy="1512168"/>
@@ -5959,7 +5910,7 @@
         </p:nvSpPr>
         <p:spPr>
           <a:xfrm>
-            <a:off x="323528" y="3573016"/>
+            <a:off x="323528" y="3113584"/>
             <a:ext cx="8568952" cy="1600438"/>
           </a:xfrm>
           <a:prstGeom prst="rect">
@@ -6424,8 +6375,8 @@
         </p:nvSpPr>
         <p:spPr>
           <a:xfrm>
-            <a:off x="107504" y="5949280"/>
-            <a:ext cx="8928992" cy="908720"/>
+            <a:off x="107504" y="5517232"/>
+            <a:ext cx="8928992" cy="1340768"/>
           </a:xfrm>
           <a:prstGeom prst="rect">
             <a:avLst/>
@@ -6474,7 +6425,7 @@
         </p:nvSpPr>
         <p:spPr>
           <a:xfrm>
-            <a:off x="251520" y="5904656"/>
+            <a:off x="251520" y="5589240"/>
             <a:ext cx="8640960" cy="369332"/>
           </a:xfrm>
           <a:prstGeom prst="rect">
@@ -6546,7 +6497,7 @@
         </p:nvSpPr>
         <p:spPr>
           <a:xfrm>
-            <a:off x="7380312" y="1556792"/>
+            <a:off x="7380312" y="1124744"/>
             <a:ext cx="1512168" cy="292388"/>
           </a:xfrm>
           <a:prstGeom prst="rect">
@@ -6586,7 +6537,7 @@
         </p:nvSpPr>
         <p:spPr>
           <a:xfrm>
-            <a:off x="395536" y="5229200"/>
+            <a:off x="395536" y="4769768"/>
             <a:ext cx="8424936" cy="646331"/>
           </a:xfrm>
           <a:prstGeom prst="rect">
@@ -6605,13 +6556,38 @@
             </a:r>
             <a:r>
               <a:rPr lang="fr-FR" i="1" dirty="0" smtClean="0"/>
-              <a:t> : 	Biblio 1 : X/Y (nb dispo/Nb total)</a:t>
-            </a:r>
-          </a:p>
-          <a:p>
+              <a:t> : 	Biblio 1 : </a:t>
+            </a:r>
             <a:r>
               <a:rPr lang="fr-FR" i="1" dirty="0" smtClean="0"/>
-              <a:t>		Biblio 2 : X/Y (nb dispo/Nb total)</a:t>
+              <a:t>X </a:t>
+            </a:r>
+            <a:r>
+              <a:rPr lang="fr-FR" i="1" dirty="0" smtClean="0"/>
+              <a:t>(nb </a:t>
+            </a:r>
+            <a:r>
+              <a:rPr lang="fr-FR" i="1" dirty="0" smtClean="0"/>
+              <a:t>dispo)</a:t>
+            </a:r>
+            <a:endParaRPr lang="fr-FR" i="1" dirty="0" smtClean="0"/>
+          </a:p>
+          <a:p>
+            <a:r>
+              <a:rPr lang="fr-FR" i="1" dirty="0" smtClean="0"/>
+              <a:t>		Biblio 2 : </a:t>
+            </a:r>
+            <a:r>
+              <a:rPr lang="fr-FR" i="1" dirty="0" smtClean="0"/>
+              <a:t>X </a:t>
+            </a:r>
+            <a:r>
+              <a:rPr lang="fr-FR" i="1" dirty="0" smtClean="0"/>
+              <a:t>(nb </a:t>
+            </a:r>
+            <a:r>
+              <a:rPr lang="fr-FR" i="1" dirty="0" smtClean="0"/>
+              <a:t>dispo)</a:t>
             </a:r>
             <a:endParaRPr lang="fr-FR" dirty="0"/>
           </a:p>
@@ -7034,7 +7010,6 @@
               <a:rPr lang="fr-FR" i="1" dirty="0" smtClean="0"/>
               <a:t>XXX-X-XXXX-XXXX-X</a:t>
             </a:r>
-            <a:endParaRPr lang="fr-FR" i="1" dirty="0" smtClean="0"/>
           </a:p>
           <a:p>
             <a:r>
@@ -7269,11 +7244,7 @@
             </a:r>
             <a:r>
               <a:rPr lang="fr-FR" b="1" dirty="0" smtClean="0"/>
-              <a:t>- </a:t>
-            </a:r>
-            <a:r>
-              <a:rPr lang="fr-FR" b="1" dirty="0" smtClean="0"/>
-              <a:t>Fin du prêt : XX/XX/XXXX</a:t>
+              <a:t>- Fin du prêt : XX/XX/XXXX</a:t>
             </a:r>
             <a:endParaRPr lang="fr-FR" b="1" dirty="0"/>
           </a:p>
@@ -7385,7 +7356,6 @@
               <a:rPr lang="fr-FR" i="1" dirty="0" smtClean="0"/>
               <a:t>XXX-X-XXXX-XXXX-X</a:t>
             </a:r>
-            <a:endParaRPr lang="fr-FR" i="1" dirty="0" smtClean="0"/>
           </a:p>
           <a:p>
             <a:r>

</xml_diff>

<commit_message>
création de la webapp : création des jsp et des actions Struts
</commit_message>
<xml_diff>
--- a/analyse/Wireframes.pptx
+++ b/analyse/Wireframes.pptx
@@ -296,9 +296,9 @@
             <a:fld id="{49211E1D-1FB6-46FD-AF96-A4F932C7C19E}" type="datetimeFigureOut">
               <a:rPr lang="fr-FR" smtClean="0"/>
               <a:pPr/>
-              <a:t>05/06/2018</a:t>
+              <a:t>28/06/2018</a:t>
             </a:fld>
-            <a:endParaRPr lang="fr-FR"/>
+            <a:endParaRPr lang="fr-FR" dirty="0"/>
           </a:p>
         </p:txBody>
       </p:sp>
@@ -317,7 +317,7 @@
           <a:bodyPr/>
           <a:lstStyle/>
           <a:p>
-            <a:endParaRPr lang="fr-FR"/>
+            <a:endParaRPr lang="fr-FR" dirty="0"/>
           </a:p>
         </p:txBody>
       </p:sp>
@@ -341,7 +341,7 @@
               <a:pPr/>
               <a:t>‹Nr.›</a:t>
             </a:fld>
-            <a:endParaRPr lang="fr-FR"/>
+            <a:endParaRPr lang="fr-FR" dirty="0"/>
           </a:p>
         </p:txBody>
       </p:sp>
@@ -463,9 +463,9 @@
             <a:fld id="{49211E1D-1FB6-46FD-AF96-A4F932C7C19E}" type="datetimeFigureOut">
               <a:rPr lang="fr-FR" smtClean="0"/>
               <a:pPr/>
-              <a:t>05/06/2018</a:t>
+              <a:t>28/06/2018</a:t>
             </a:fld>
-            <a:endParaRPr lang="fr-FR"/>
+            <a:endParaRPr lang="fr-FR" dirty="0"/>
           </a:p>
         </p:txBody>
       </p:sp>
@@ -484,7 +484,7 @@
           <a:bodyPr/>
           <a:lstStyle/>
           <a:p>
-            <a:endParaRPr lang="fr-FR"/>
+            <a:endParaRPr lang="fr-FR" dirty="0"/>
           </a:p>
         </p:txBody>
       </p:sp>
@@ -508,7 +508,7 @@
               <a:pPr/>
               <a:t>‹Nr.›</a:t>
             </a:fld>
-            <a:endParaRPr lang="fr-FR"/>
+            <a:endParaRPr lang="fr-FR" dirty="0"/>
           </a:p>
         </p:txBody>
       </p:sp>
@@ -640,9 +640,9 @@
             <a:fld id="{49211E1D-1FB6-46FD-AF96-A4F932C7C19E}" type="datetimeFigureOut">
               <a:rPr lang="fr-FR" smtClean="0"/>
               <a:pPr/>
-              <a:t>05/06/2018</a:t>
+              <a:t>28/06/2018</a:t>
             </a:fld>
-            <a:endParaRPr lang="fr-FR"/>
+            <a:endParaRPr lang="fr-FR" dirty="0"/>
           </a:p>
         </p:txBody>
       </p:sp>
@@ -661,7 +661,7 @@
           <a:bodyPr/>
           <a:lstStyle/>
           <a:p>
-            <a:endParaRPr lang="fr-FR"/>
+            <a:endParaRPr lang="fr-FR" dirty="0"/>
           </a:p>
         </p:txBody>
       </p:sp>
@@ -685,7 +685,7 @@
               <a:pPr/>
               <a:t>‹Nr.›</a:t>
             </a:fld>
-            <a:endParaRPr lang="fr-FR"/>
+            <a:endParaRPr lang="fr-FR" dirty="0"/>
           </a:p>
         </p:txBody>
       </p:sp>
@@ -807,9 +807,9 @@
             <a:fld id="{49211E1D-1FB6-46FD-AF96-A4F932C7C19E}" type="datetimeFigureOut">
               <a:rPr lang="fr-FR" smtClean="0"/>
               <a:pPr/>
-              <a:t>05/06/2018</a:t>
+              <a:t>28/06/2018</a:t>
             </a:fld>
-            <a:endParaRPr lang="fr-FR"/>
+            <a:endParaRPr lang="fr-FR" dirty="0"/>
           </a:p>
         </p:txBody>
       </p:sp>
@@ -828,7 +828,7 @@
           <a:bodyPr/>
           <a:lstStyle/>
           <a:p>
-            <a:endParaRPr lang="fr-FR"/>
+            <a:endParaRPr lang="fr-FR" dirty="0"/>
           </a:p>
         </p:txBody>
       </p:sp>
@@ -852,7 +852,7 @@
               <a:pPr/>
               <a:t>‹Nr.›</a:t>
             </a:fld>
-            <a:endParaRPr lang="fr-FR"/>
+            <a:endParaRPr lang="fr-FR" dirty="0"/>
           </a:p>
         </p:txBody>
       </p:sp>
@@ -1050,9 +1050,9 @@
             <a:fld id="{49211E1D-1FB6-46FD-AF96-A4F932C7C19E}" type="datetimeFigureOut">
               <a:rPr lang="fr-FR" smtClean="0"/>
               <a:pPr/>
-              <a:t>05/06/2018</a:t>
+              <a:t>28/06/2018</a:t>
             </a:fld>
-            <a:endParaRPr lang="fr-FR"/>
+            <a:endParaRPr lang="fr-FR" dirty="0"/>
           </a:p>
         </p:txBody>
       </p:sp>
@@ -1071,7 +1071,7 @@
           <a:bodyPr/>
           <a:lstStyle/>
           <a:p>
-            <a:endParaRPr lang="fr-FR"/>
+            <a:endParaRPr lang="fr-FR" dirty="0"/>
           </a:p>
         </p:txBody>
       </p:sp>
@@ -1095,7 +1095,7 @@
               <a:pPr/>
               <a:t>‹Nr.›</a:t>
             </a:fld>
-            <a:endParaRPr lang="fr-FR"/>
+            <a:endParaRPr lang="fr-FR" dirty="0"/>
           </a:p>
         </p:txBody>
       </p:sp>
@@ -1335,9 +1335,9 @@
             <a:fld id="{49211E1D-1FB6-46FD-AF96-A4F932C7C19E}" type="datetimeFigureOut">
               <a:rPr lang="fr-FR" smtClean="0"/>
               <a:pPr/>
-              <a:t>05/06/2018</a:t>
+              <a:t>28/06/2018</a:t>
             </a:fld>
-            <a:endParaRPr lang="fr-FR"/>
+            <a:endParaRPr lang="fr-FR" dirty="0"/>
           </a:p>
         </p:txBody>
       </p:sp>
@@ -1356,7 +1356,7 @@
           <a:bodyPr/>
           <a:lstStyle/>
           <a:p>
-            <a:endParaRPr lang="fr-FR"/>
+            <a:endParaRPr lang="fr-FR" dirty="0"/>
           </a:p>
         </p:txBody>
       </p:sp>
@@ -1380,7 +1380,7 @@
               <a:pPr/>
               <a:t>‹Nr.›</a:t>
             </a:fld>
-            <a:endParaRPr lang="fr-FR"/>
+            <a:endParaRPr lang="fr-FR" dirty="0"/>
           </a:p>
         </p:txBody>
       </p:sp>
@@ -1754,9 +1754,9 @@
             <a:fld id="{49211E1D-1FB6-46FD-AF96-A4F932C7C19E}" type="datetimeFigureOut">
               <a:rPr lang="fr-FR" smtClean="0"/>
               <a:pPr/>
-              <a:t>05/06/2018</a:t>
+              <a:t>28/06/2018</a:t>
             </a:fld>
-            <a:endParaRPr lang="fr-FR"/>
+            <a:endParaRPr lang="fr-FR" dirty="0"/>
           </a:p>
         </p:txBody>
       </p:sp>
@@ -1775,7 +1775,7 @@
           <a:bodyPr/>
           <a:lstStyle/>
           <a:p>
-            <a:endParaRPr lang="fr-FR"/>
+            <a:endParaRPr lang="fr-FR" dirty="0"/>
           </a:p>
         </p:txBody>
       </p:sp>
@@ -1799,7 +1799,7 @@
               <a:pPr/>
               <a:t>‹Nr.›</a:t>
             </a:fld>
-            <a:endParaRPr lang="fr-FR"/>
+            <a:endParaRPr lang="fr-FR" dirty="0"/>
           </a:p>
         </p:txBody>
       </p:sp>
@@ -1869,9 +1869,9 @@
             <a:fld id="{49211E1D-1FB6-46FD-AF96-A4F932C7C19E}" type="datetimeFigureOut">
               <a:rPr lang="fr-FR" smtClean="0"/>
               <a:pPr/>
-              <a:t>05/06/2018</a:t>
+              <a:t>28/06/2018</a:t>
             </a:fld>
-            <a:endParaRPr lang="fr-FR"/>
+            <a:endParaRPr lang="fr-FR" dirty="0"/>
           </a:p>
         </p:txBody>
       </p:sp>
@@ -1890,7 +1890,7 @@
           <a:bodyPr/>
           <a:lstStyle/>
           <a:p>
-            <a:endParaRPr lang="fr-FR"/>
+            <a:endParaRPr lang="fr-FR" dirty="0"/>
           </a:p>
         </p:txBody>
       </p:sp>
@@ -1914,7 +1914,7 @@
               <a:pPr/>
               <a:t>‹Nr.›</a:t>
             </a:fld>
-            <a:endParaRPr lang="fr-FR"/>
+            <a:endParaRPr lang="fr-FR" dirty="0"/>
           </a:p>
         </p:txBody>
       </p:sp>
@@ -1961,9 +1961,9 @@
             <a:fld id="{49211E1D-1FB6-46FD-AF96-A4F932C7C19E}" type="datetimeFigureOut">
               <a:rPr lang="fr-FR" smtClean="0"/>
               <a:pPr/>
-              <a:t>05/06/2018</a:t>
+              <a:t>28/06/2018</a:t>
             </a:fld>
-            <a:endParaRPr lang="fr-FR"/>
+            <a:endParaRPr lang="fr-FR" dirty="0"/>
           </a:p>
         </p:txBody>
       </p:sp>
@@ -1982,7 +1982,7 @@
           <a:bodyPr/>
           <a:lstStyle/>
           <a:p>
-            <a:endParaRPr lang="fr-FR"/>
+            <a:endParaRPr lang="fr-FR" dirty="0"/>
           </a:p>
         </p:txBody>
       </p:sp>
@@ -2006,7 +2006,7 @@
               <a:pPr/>
               <a:t>‹Nr.›</a:t>
             </a:fld>
-            <a:endParaRPr lang="fr-FR"/>
+            <a:endParaRPr lang="fr-FR" dirty="0"/>
           </a:p>
         </p:txBody>
       </p:sp>
@@ -2235,9 +2235,9 @@
             <a:fld id="{49211E1D-1FB6-46FD-AF96-A4F932C7C19E}" type="datetimeFigureOut">
               <a:rPr lang="fr-FR" smtClean="0"/>
               <a:pPr/>
-              <a:t>05/06/2018</a:t>
+              <a:t>28/06/2018</a:t>
             </a:fld>
-            <a:endParaRPr lang="fr-FR"/>
+            <a:endParaRPr lang="fr-FR" dirty="0"/>
           </a:p>
         </p:txBody>
       </p:sp>
@@ -2256,7 +2256,7 @@
           <a:bodyPr/>
           <a:lstStyle/>
           <a:p>
-            <a:endParaRPr lang="fr-FR"/>
+            <a:endParaRPr lang="fr-FR" dirty="0"/>
           </a:p>
         </p:txBody>
       </p:sp>
@@ -2280,7 +2280,7 @@
               <a:pPr/>
               <a:t>‹Nr.›</a:t>
             </a:fld>
-            <a:endParaRPr lang="fr-FR"/>
+            <a:endParaRPr lang="fr-FR" dirty="0"/>
           </a:p>
         </p:txBody>
       </p:sp>
@@ -2398,7 +2398,7 @@
             </a:lvl9pPr>
           </a:lstStyle>
           <a:p>
-            <a:endParaRPr lang="fr-FR"/>
+            <a:endParaRPr lang="fr-FR" dirty="0"/>
           </a:p>
         </p:txBody>
       </p:sp>
@@ -2485,9 +2485,9 @@
             <a:fld id="{49211E1D-1FB6-46FD-AF96-A4F932C7C19E}" type="datetimeFigureOut">
               <a:rPr lang="fr-FR" smtClean="0"/>
               <a:pPr/>
-              <a:t>05/06/2018</a:t>
+              <a:t>28/06/2018</a:t>
             </a:fld>
-            <a:endParaRPr lang="fr-FR"/>
+            <a:endParaRPr lang="fr-FR" dirty="0"/>
           </a:p>
         </p:txBody>
       </p:sp>
@@ -2506,7 +2506,7 @@
           <a:bodyPr/>
           <a:lstStyle/>
           <a:p>
-            <a:endParaRPr lang="fr-FR"/>
+            <a:endParaRPr lang="fr-FR" dirty="0"/>
           </a:p>
         </p:txBody>
       </p:sp>
@@ -2530,7 +2530,7 @@
               <a:pPr/>
               <a:t>‹Nr.›</a:t>
             </a:fld>
-            <a:endParaRPr lang="fr-FR"/>
+            <a:endParaRPr lang="fr-FR" dirty="0"/>
           </a:p>
         </p:txBody>
       </p:sp>
@@ -2695,9 +2695,9 @@
             <a:fld id="{49211E1D-1FB6-46FD-AF96-A4F932C7C19E}" type="datetimeFigureOut">
               <a:rPr lang="fr-FR" smtClean="0"/>
               <a:pPr/>
-              <a:t>05/06/2018</a:t>
+              <a:t>28/06/2018</a:t>
             </a:fld>
-            <a:endParaRPr lang="fr-FR"/>
+            <a:endParaRPr lang="fr-FR" dirty="0"/>
           </a:p>
         </p:txBody>
       </p:sp>
@@ -2734,7 +2734,7 @@
             </a:lvl1pPr>
           </a:lstStyle>
           <a:p>
-            <a:endParaRPr lang="fr-FR"/>
+            <a:endParaRPr lang="fr-FR" dirty="0"/>
           </a:p>
         </p:txBody>
       </p:sp>
@@ -2776,7 +2776,7 @@
               <a:pPr/>
               <a:t>‹Nr.›</a:t>
             </a:fld>
-            <a:endParaRPr lang="fr-FR"/>
+            <a:endParaRPr lang="fr-FR" dirty="0"/>
           </a:p>
         </p:txBody>
       </p:sp>
@@ -3329,15 +3329,7 @@
             <a:pPr algn="ctr"/>
             <a:r>
               <a:rPr lang="fr-FR" sz="2800" b="1" dirty="0" smtClean="0"/>
-              <a:t>Bienvenue sur « Biblio », le site des bibliothèques de «  </a:t>
-            </a:r>
-            <a:r>
-              <a:rPr lang="fr-FR" sz="2800" b="1" dirty="0" err="1" smtClean="0"/>
-              <a:t>Trifouilly</a:t>
-            </a:r>
-            <a:r>
-              <a:rPr lang="fr-FR" sz="2800" b="1" dirty="0" smtClean="0"/>
-              <a:t>-les-oies »</a:t>
+              <a:t>Bienvenue sur « Biblio », le site des bibliothèques de «  Trifouilly-les-oies »</a:t>
             </a:r>
             <a:endParaRPr lang="fr-FR" sz="2800" b="1" dirty="0"/>
           </a:p>
@@ -3522,7 +3514,7 @@
           <a:lstStyle/>
           <a:p>
             <a:pPr algn="ctr"/>
-            <a:endParaRPr lang="fr-FR"/>
+            <a:endParaRPr lang="fr-FR" dirty="0"/>
           </a:p>
         </p:txBody>
       </p:sp>
@@ -3565,7 +3557,7 @@
           <a:lstStyle/>
           <a:p>
             <a:pPr algn="ctr"/>
-            <a:endParaRPr lang="fr-FR"/>
+            <a:endParaRPr lang="fr-FR" dirty="0"/>
           </a:p>
         </p:txBody>
       </p:sp>
@@ -3608,7 +3600,7 @@
           <a:lstStyle/>
           <a:p>
             <a:pPr algn="ctr"/>
-            <a:endParaRPr lang="fr-FR"/>
+            <a:endParaRPr lang="fr-FR" dirty="0"/>
           </a:p>
         </p:txBody>
       </p:sp>
@@ -3651,7 +3643,7 @@
           <a:lstStyle/>
           <a:p>
             <a:pPr algn="ctr"/>
-            <a:endParaRPr lang="fr-FR"/>
+            <a:endParaRPr lang="fr-FR" dirty="0"/>
           </a:p>
         </p:txBody>
       </p:sp>
@@ -3694,7 +3686,7 @@
           <a:lstStyle/>
           <a:p>
             <a:pPr algn="ctr"/>
-            <a:endParaRPr lang="fr-FR"/>
+            <a:endParaRPr lang="fr-FR" dirty="0"/>
           </a:p>
         </p:txBody>
       </p:sp>
@@ -4128,7 +4120,7 @@
           <a:lstStyle/>
           <a:p>
             <a:pPr algn="ctr"/>
-            <a:endParaRPr lang="fr-FR"/>
+            <a:endParaRPr lang="fr-FR" dirty="0"/>
           </a:p>
         </p:txBody>
       </p:sp>
@@ -4171,7 +4163,7 @@
           <a:lstStyle/>
           <a:p>
             <a:pPr algn="ctr"/>
-            <a:endParaRPr lang="fr-FR"/>
+            <a:endParaRPr lang="fr-FR" dirty="0"/>
           </a:p>
         </p:txBody>
       </p:sp>
@@ -5298,7 +5290,7 @@
           <a:lstStyle/>
           <a:p>
             <a:pPr algn="ctr"/>
-            <a:endParaRPr lang="fr-FR"/>
+            <a:endParaRPr lang="fr-FR" dirty="0"/>
           </a:p>
         </p:txBody>
       </p:sp>
@@ -5355,7 +5347,7 @@
             <a:lstStyle/>
             <a:p>
               <a:pPr algn="ctr"/>
-              <a:endParaRPr lang="fr-FR"/>
+              <a:endParaRPr lang="fr-FR" dirty="0"/>
             </a:p>
           </p:txBody>
         </p:sp>
@@ -5474,7 +5466,7 @@
           <a:lstStyle/>
           <a:p>
             <a:pPr algn="ctr"/>
-            <a:endParaRPr lang="fr-FR"/>
+            <a:endParaRPr lang="fr-FR" dirty="0"/>
           </a:p>
         </p:txBody>
       </p:sp>
@@ -5531,7 +5523,7 @@
             <a:lstStyle/>
             <a:p>
               <a:pPr algn="ctr"/>
-              <a:endParaRPr lang="fr-FR"/>
+              <a:endParaRPr lang="fr-FR" dirty="0"/>
             </a:p>
           </p:txBody>
         </p:sp>
@@ -5732,12 +5724,8 @@
               <a:t>Genre : </a:t>
             </a:r>
             <a:r>
-              <a:rPr lang="fr-FR" i="1" dirty="0" err="1" smtClean="0"/>
-              <a:t>Xxxx</a:t>
-            </a:r>
-            <a:r>
               <a:rPr lang="fr-FR" i="1" dirty="0" smtClean="0"/>
-              <a:t>			</a:t>
+              <a:t>Xxxx			</a:t>
             </a:r>
             <a:r>
               <a:rPr lang="fr-FR" dirty="0" smtClean="0"/>
@@ -5759,13 +5747,8 @@
             </a:r>
             <a:r>
               <a:rPr lang="fr-FR" dirty="0" smtClean="0"/>
-              <a:t>Editeur : </a:t>
-            </a:r>
-            <a:r>
-              <a:rPr lang="fr-FR" dirty="0" err="1" smtClean="0"/>
-              <a:t>Xxxxx</a:t>
-            </a:r>
-            <a:endParaRPr lang="fr-FR" dirty="0" smtClean="0"/>
+              <a:t>Editeur : Xxxxx</a:t>
+            </a:r>
           </a:p>
         </p:txBody>
       </p:sp>
@@ -5827,7 +5810,7 @@
             <a:lstStyle/>
             <a:p>
               <a:pPr algn="ctr"/>
-              <a:endParaRPr lang="fr-FR"/>
+              <a:endParaRPr lang="fr-FR" dirty="0"/>
             </a:p>
           </p:txBody>
         </p:sp>
@@ -5933,436 +5916,8 @@
           <a:p>
             <a:pPr algn="just"/>
             <a:r>
-              <a:rPr lang="fr-FR" sz="1600" dirty="0" err="1"/>
-              <a:t>Lorem</a:t>
-            </a:r>
-            <a:r>
               <a:rPr lang="fr-FR" sz="1600" dirty="0"/>
-              <a:t> </a:t>
-            </a:r>
-            <a:r>
-              <a:rPr lang="fr-FR" sz="1600" dirty="0" err="1"/>
-              <a:t>ipsum</a:t>
-            </a:r>
-            <a:r>
-              <a:rPr lang="fr-FR" sz="1600" dirty="0"/>
-              <a:t> </a:t>
-            </a:r>
-            <a:r>
-              <a:rPr lang="fr-FR" sz="1600" dirty="0" err="1"/>
-              <a:t>dolor</a:t>
-            </a:r>
-            <a:r>
-              <a:rPr lang="fr-FR" sz="1600" dirty="0"/>
-              <a:t> </a:t>
-            </a:r>
-            <a:r>
-              <a:rPr lang="fr-FR" sz="1600" dirty="0" err="1"/>
-              <a:t>sit</a:t>
-            </a:r>
-            <a:r>
-              <a:rPr lang="fr-FR" sz="1600" dirty="0"/>
-              <a:t> </a:t>
-            </a:r>
-            <a:r>
-              <a:rPr lang="fr-FR" sz="1600" dirty="0" err="1"/>
-              <a:t>amet</a:t>
-            </a:r>
-            <a:r>
-              <a:rPr lang="fr-FR" sz="1600" dirty="0"/>
-              <a:t>, </a:t>
-            </a:r>
-            <a:r>
-              <a:rPr lang="fr-FR" sz="1600" dirty="0" err="1"/>
-              <a:t>consectetur</a:t>
-            </a:r>
-            <a:r>
-              <a:rPr lang="fr-FR" sz="1600" dirty="0"/>
-              <a:t> </a:t>
-            </a:r>
-            <a:r>
-              <a:rPr lang="fr-FR" sz="1600" dirty="0" err="1"/>
-              <a:t>adipiscing</a:t>
-            </a:r>
-            <a:r>
-              <a:rPr lang="fr-FR" sz="1600" dirty="0"/>
-              <a:t> </a:t>
-            </a:r>
-            <a:r>
-              <a:rPr lang="fr-FR" sz="1600" dirty="0" err="1"/>
-              <a:t>elit</a:t>
-            </a:r>
-            <a:r>
-              <a:rPr lang="fr-FR" sz="1600" dirty="0"/>
-              <a:t>. </a:t>
-            </a:r>
-            <a:r>
-              <a:rPr lang="fr-FR" sz="1600" dirty="0" err="1"/>
-              <a:t>Phasellus</a:t>
-            </a:r>
-            <a:r>
-              <a:rPr lang="fr-FR" sz="1600" dirty="0"/>
-              <a:t> </a:t>
-            </a:r>
-            <a:r>
-              <a:rPr lang="fr-FR" sz="1600" dirty="0" err="1"/>
-              <a:t>tempus</a:t>
-            </a:r>
-            <a:r>
-              <a:rPr lang="fr-FR" sz="1600" dirty="0"/>
-              <a:t> </a:t>
-            </a:r>
-            <a:r>
-              <a:rPr lang="fr-FR" sz="1600" dirty="0" err="1"/>
-              <a:t>congue</a:t>
-            </a:r>
-            <a:r>
-              <a:rPr lang="fr-FR" sz="1600" dirty="0"/>
-              <a:t> mollis. Nunc in </a:t>
-            </a:r>
-            <a:r>
-              <a:rPr lang="fr-FR" sz="1600" dirty="0" err="1"/>
-              <a:t>nulla</a:t>
-            </a:r>
-            <a:r>
-              <a:rPr lang="fr-FR" sz="1600" dirty="0"/>
-              <a:t> </a:t>
-            </a:r>
-            <a:r>
-              <a:rPr lang="fr-FR" sz="1600" dirty="0" err="1"/>
-              <a:t>dictum</a:t>
-            </a:r>
-            <a:r>
-              <a:rPr lang="fr-FR" sz="1600" dirty="0"/>
-              <a:t>, </a:t>
-            </a:r>
-            <a:r>
-              <a:rPr lang="fr-FR" sz="1600" dirty="0" err="1"/>
-              <a:t>lacinia</a:t>
-            </a:r>
-            <a:r>
-              <a:rPr lang="fr-FR" sz="1600" dirty="0"/>
-              <a:t> </a:t>
-            </a:r>
-            <a:r>
-              <a:rPr lang="fr-FR" sz="1600" dirty="0" err="1"/>
-              <a:t>turpis</a:t>
-            </a:r>
-            <a:r>
-              <a:rPr lang="fr-FR" sz="1600" dirty="0"/>
-              <a:t> non, </a:t>
-            </a:r>
-            <a:r>
-              <a:rPr lang="fr-FR" sz="1600" dirty="0" err="1"/>
-              <a:t>dapibus</a:t>
-            </a:r>
-            <a:r>
-              <a:rPr lang="fr-FR" sz="1600" dirty="0"/>
-              <a:t> </a:t>
-            </a:r>
-            <a:r>
-              <a:rPr lang="fr-FR" sz="1600" dirty="0" err="1"/>
-              <a:t>purus</a:t>
-            </a:r>
-            <a:r>
-              <a:rPr lang="fr-FR" sz="1600" dirty="0"/>
-              <a:t>. </a:t>
-            </a:r>
-            <a:r>
-              <a:rPr lang="fr-FR" sz="1600" dirty="0" err="1"/>
-              <a:t>Cras</a:t>
-            </a:r>
-            <a:r>
-              <a:rPr lang="fr-FR" sz="1600" dirty="0"/>
-              <a:t> id </a:t>
-            </a:r>
-            <a:r>
-              <a:rPr lang="fr-FR" sz="1600" dirty="0" err="1"/>
-              <a:t>lacinia</a:t>
-            </a:r>
-            <a:r>
-              <a:rPr lang="fr-FR" sz="1600" dirty="0"/>
-              <a:t> </a:t>
-            </a:r>
-            <a:r>
-              <a:rPr lang="fr-FR" sz="1600" dirty="0" err="1"/>
-              <a:t>odio</a:t>
-            </a:r>
-            <a:r>
-              <a:rPr lang="fr-FR" sz="1600" dirty="0"/>
-              <a:t>, vitae </a:t>
-            </a:r>
-            <a:r>
-              <a:rPr lang="fr-FR" sz="1600" dirty="0" err="1"/>
-              <a:t>aliquet</a:t>
-            </a:r>
-            <a:r>
-              <a:rPr lang="fr-FR" sz="1600" dirty="0"/>
-              <a:t> </a:t>
-            </a:r>
-            <a:r>
-              <a:rPr lang="fr-FR" sz="1600" dirty="0" err="1"/>
-              <a:t>odio</a:t>
-            </a:r>
-            <a:r>
-              <a:rPr lang="fr-FR" sz="1600" dirty="0"/>
-              <a:t>. In </a:t>
-            </a:r>
-            <a:r>
-              <a:rPr lang="fr-FR" sz="1600" dirty="0" err="1"/>
-              <a:t>sit</a:t>
-            </a:r>
-            <a:r>
-              <a:rPr lang="fr-FR" sz="1600" dirty="0"/>
-              <a:t> </a:t>
-            </a:r>
-            <a:r>
-              <a:rPr lang="fr-FR" sz="1600" dirty="0" err="1"/>
-              <a:t>amet</a:t>
-            </a:r>
-            <a:r>
-              <a:rPr lang="fr-FR" sz="1600" dirty="0"/>
-              <a:t> </a:t>
-            </a:r>
-            <a:r>
-              <a:rPr lang="fr-FR" sz="1600" dirty="0" err="1"/>
-              <a:t>ullamcorper</a:t>
-            </a:r>
-            <a:r>
-              <a:rPr lang="fr-FR" sz="1600" dirty="0"/>
-              <a:t> </a:t>
-            </a:r>
-            <a:r>
-              <a:rPr lang="fr-FR" sz="1600" dirty="0" err="1"/>
-              <a:t>odio</a:t>
-            </a:r>
-            <a:r>
-              <a:rPr lang="fr-FR" sz="1600" dirty="0"/>
-              <a:t>, </a:t>
-            </a:r>
-            <a:r>
-              <a:rPr lang="fr-FR" sz="1600" dirty="0" err="1"/>
-              <a:t>at</a:t>
-            </a:r>
-            <a:r>
-              <a:rPr lang="fr-FR" sz="1600" dirty="0"/>
-              <a:t> </a:t>
-            </a:r>
-            <a:r>
-              <a:rPr lang="fr-FR" sz="1600" dirty="0" err="1"/>
-              <a:t>interdum</a:t>
-            </a:r>
-            <a:r>
-              <a:rPr lang="fr-FR" sz="1600" dirty="0"/>
-              <a:t> </a:t>
-            </a:r>
-            <a:r>
-              <a:rPr lang="fr-FR" sz="1600" dirty="0" err="1"/>
-              <a:t>velit</a:t>
-            </a:r>
-            <a:r>
-              <a:rPr lang="fr-FR" sz="1600" dirty="0"/>
-              <a:t>. </a:t>
-            </a:r>
-            <a:r>
-              <a:rPr lang="fr-FR" sz="1600" dirty="0" err="1"/>
-              <a:t>Donec</a:t>
-            </a:r>
-            <a:r>
-              <a:rPr lang="fr-FR" sz="1600" dirty="0"/>
-              <a:t> a libero magna. </a:t>
-            </a:r>
-            <a:r>
-              <a:rPr lang="fr-FR" sz="1600" dirty="0" err="1"/>
-              <a:t>Phasellus</a:t>
-            </a:r>
-            <a:r>
-              <a:rPr lang="fr-FR" sz="1600" dirty="0"/>
-              <a:t> </a:t>
-            </a:r>
-            <a:r>
-              <a:rPr lang="fr-FR" sz="1600" dirty="0" err="1"/>
-              <a:t>dignissim</a:t>
-            </a:r>
-            <a:r>
-              <a:rPr lang="fr-FR" sz="1600" dirty="0"/>
-              <a:t> </a:t>
-            </a:r>
-            <a:r>
-              <a:rPr lang="fr-FR" sz="1600" dirty="0" err="1"/>
-              <a:t>sagittis</a:t>
-            </a:r>
-            <a:r>
-              <a:rPr lang="fr-FR" sz="1600" dirty="0"/>
-              <a:t> </a:t>
-            </a:r>
-            <a:r>
-              <a:rPr lang="fr-FR" sz="1600" dirty="0" err="1"/>
-              <a:t>dui</a:t>
-            </a:r>
-            <a:r>
-              <a:rPr lang="fr-FR" sz="1600" dirty="0"/>
-              <a:t>, vitae </a:t>
-            </a:r>
-            <a:r>
-              <a:rPr lang="fr-FR" sz="1600" dirty="0" err="1"/>
-              <a:t>interdum</a:t>
-            </a:r>
-            <a:r>
-              <a:rPr lang="fr-FR" sz="1600" dirty="0"/>
-              <a:t> erat </a:t>
-            </a:r>
-            <a:r>
-              <a:rPr lang="fr-FR" sz="1600" dirty="0" err="1"/>
-              <a:t>finibus</a:t>
-            </a:r>
-            <a:r>
-              <a:rPr lang="fr-FR" sz="1600" dirty="0"/>
-              <a:t> </a:t>
-            </a:r>
-            <a:r>
-              <a:rPr lang="fr-FR" sz="1600" dirty="0" err="1"/>
-              <a:t>sit</a:t>
-            </a:r>
-            <a:r>
-              <a:rPr lang="fr-FR" sz="1600" dirty="0"/>
-              <a:t> </a:t>
-            </a:r>
-            <a:r>
-              <a:rPr lang="fr-FR" sz="1600" dirty="0" err="1"/>
-              <a:t>amet</a:t>
-            </a:r>
-            <a:r>
-              <a:rPr lang="fr-FR" sz="1600" dirty="0"/>
-              <a:t>. Sed </a:t>
-            </a:r>
-            <a:r>
-              <a:rPr lang="fr-FR" sz="1600" dirty="0" err="1"/>
-              <a:t>vel</a:t>
-            </a:r>
-            <a:r>
-              <a:rPr lang="fr-FR" sz="1600" dirty="0"/>
-              <a:t> </a:t>
-            </a:r>
-            <a:r>
-              <a:rPr lang="fr-FR" sz="1600" dirty="0" err="1"/>
-              <a:t>vehicula</a:t>
-            </a:r>
-            <a:r>
-              <a:rPr lang="fr-FR" sz="1600" dirty="0"/>
-              <a:t> </a:t>
-            </a:r>
-            <a:r>
-              <a:rPr lang="fr-FR" sz="1600" dirty="0" err="1"/>
-              <a:t>lorem</a:t>
-            </a:r>
-            <a:r>
-              <a:rPr lang="fr-FR" sz="1600" dirty="0"/>
-              <a:t>, id </a:t>
-            </a:r>
-            <a:r>
-              <a:rPr lang="fr-FR" sz="1600" dirty="0" err="1"/>
-              <a:t>sodales</a:t>
-            </a:r>
-            <a:r>
-              <a:rPr lang="fr-FR" sz="1600" dirty="0"/>
-              <a:t> ante. </a:t>
-            </a:r>
-            <a:r>
-              <a:rPr lang="fr-FR" sz="1600" dirty="0" err="1"/>
-              <a:t>Praesent</a:t>
-            </a:r>
-            <a:r>
-              <a:rPr lang="fr-FR" sz="1600" dirty="0"/>
-              <a:t> </a:t>
-            </a:r>
-            <a:r>
-              <a:rPr lang="fr-FR" sz="1600" dirty="0" err="1"/>
-              <a:t>faucibus</a:t>
-            </a:r>
-            <a:r>
-              <a:rPr lang="fr-FR" sz="1600" dirty="0"/>
-              <a:t> erat non ante </a:t>
-            </a:r>
-            <a:r>
-              <a:rPr lang="fr-FR" sz="1600" dirty="0" err="1"/>
-              <a:t>pellentesque</a:t>
-            </a:r>
-            <a:r>
-              <a:rPr lang="fr-FR" sz="1600" dirty="0"/>
-              <a:t>, et </a:t>
-            </a:r>
-            <a:r>
-              <a:rPr lang="fr-FR" sz="1600" dirty="0" err="1"/>
-              <a:t>ultrices</a:t>
-            </a:r>
-            <a:r>
-              <a:rPr lang="fr-FR" sz="1600" dirty="0"/>
-              <a:t> </a:t>
-            </a:r>
-            <a:r>
-              <a:rPr lang="fr-FR" sz="1600" dirty="0" err="1"/>
-              <a:t>ligula</a:t>
-            </a:r>
-            <a:r>
-              <a:rPr lang="fr-FR" sz="1600" dirty="0"/>
-              <a:t> </a:t>
-            </a:r>
-            <a:r>
-              <a:rPr lang="fr-FR" sz="1600" dirty="0" err="1"/>
-              <a:t>sagittis</a:t>
-            </a:r>
-            <a:r>
-              <a:rPr lang="fr-FR" sz="1600" dirty="0"/>
-              <a:t>. Ut in </a:t>
-            </a:r>
-            <a:r>
-              <a:rPr lang="fr-FR" sz="1600" dirty="0" err="1"/>
-              <a:t>dolor</a:t>
-            </a:r>
-            <a:r>
-              <a:rPr lang="fr-FR" sz="1600" dirty="0"/>
-              <a:t> vitae </a:t>
-            </a:r>
-            <a:r>
-              <a:rPr lang="fr-FR" sz="1600" dirty="0" err="1"/>
-              <a:t>risus</a:t>
-            </a:r>
-            <a:r>
-              <a:rPr lang="fr-FR" sz="1600" dirty="0"/>
-              <a:t> </a:t>
-            </a:r>
-            <a:r>
-              <a:rPr lang="fr-FR" sz="1600" dirty="0" err="1"/>
-              <a:t>congue</a:t>
-            </a:r>
-            <a:r>
-              <a:rPr lang="fr-FR" sz="1600" dirty="0"/>
-              <a:t> </a:t>
-            </a:r>
-            <a:r>
-              <a:rPr lang="fr-FR" sz="1600" dirty="0" err="1"/>
-              <a:t>aliquet</a:t>
-            </a:r>
-            <a:r>
-              <a:rPr lang="fr-FR" sz="1600" dirty="0"/>
-              <a:t> id </a:t>
-            </a:r>
-            <a:r>
-              <a:rPr lang="fr-FR" sz="1600" dirty="0" err="1"/>
-              <a:t>quis</a:t>
-            </a:r>
-            <a:r>
-              <a:rPr lang="fr-FR" sz="1600" dirty="0"/>
-              <a:t> </a:t>
-            </a:r>
-            <a:r>
-              <a:rPr lang="fr-FR" sz="1600" dirty="0" err="1"/>
-              <a:t>arcu</a:t>
-            </a:r>
-            <a:r>
-              <a:rPr lang="fr-FR" sz="1600" dirty="0"/>
-              <a:t>. </a:t>
+              <a:t>Lorem ipsum dolor sit amet, consectetur adipiscing elit. Phasellus tempus congue mollis. Nunc in nulla dictum, lacinia turpis non, dapibus purus. Cras id lacinia odio, vitae aliquet odio. In sit amet ullamcorper odio, at interdum velit. Donec a libero magna. Phasellus dignissim sagittis dui, vitae interdum erat finibus sit amet. Sed vel vehicula lorem, id sodales ante. Praesent faucibus erat non ante pellentesque, et ultrices ligula sagittis. Ut in dolor vitae risus congue aliquet id quis arcu. </a:t>
             </a:r>
           </a:p>
         </p:txBody>
@@ -6556,38 +6111,13 @@
             </a:r>
             <a:r>
               <a:rPr lang="fr-FR" i="1" dirty="0" smtClean="0"/>
-              <a:t> : 	Biblio 1 : </a:t>
-            </a:r>
+              <a:t> : 	Biblio 1 : X (nb dispo)</a:t>
+            </a:r>
+          </a:p>
+          <a:p>
             <a:r>
               <a:rPr lang="fr-FR" i="1" dirty="0" smtClean="0"/>
-              <a:t>X </a:t>
-            </a:r>
-            <a:r>
-              <a:rPr lang="fr-FR" i="1" dirty="0" smtClean="0"/>
-              <a:t>(nb </a:t>
-            </a:r>
-            <a:r>
-              <a:rPr lang="fr-FR" i="1" dirty="0" smtClean="0"/>
-              <a:t>dispo)</a:t>
-            </a:r>
-            <a:endParaRPr lang="fr-FR" i="1" dirty="0" smtClean="0"/>
-          </a:p>
-          <a:p>
-            <a:r>
-              <a:rPr lang="fr-FR" i="1" dirty="0" smtClean="0"/>
-              <a:t>		Biblio 2 : </a:t>
-            </a:r>
-            <a:r>
-              <a:rPr lang="fr-FR" i="1" dirty="0" smtClean="0"/>
-              <a:t>X </a:t>
-            </a:r>
-            <a:r>
-              <a:rPr lang="fr-FR" i="1" dirty="0" smtClean="0"/>
-              <a:t>(nb </a:t>
-            </a:r>
-            <a:r>
-              <a:rPr lang="fr-FR" i="1" dirty="0" smtClean="0"/>
-              <a:t>dispo)</a:t>
+              <a:t>		Biblio 2 : X (nb dispo)</a:t>
             </a:r>
             <a:endParaRPr lang="fr-FR" dirty="0"/>
           </a:p>
@@ -6995,12 +6525,8 @@
               <a:t>Genre : </a:t>
             </a:r>
             <a:r>
-              <a:rPr lang="fr-FR" i="1" dirty="0" err="1" smtClean="0"/>
-              <a:t>Xxxx</a:t>
-            </a:r>
-            <a:r>
               <a:rPr lang="fr-FR" i="1" dirty="0" smtClean="0"/>
-              <a:t>			</a:t>
+              <a:t>Xxxx			</a:t>
             </a:r>
             <a:r>
               <a:rPr lang="fr-FR" dirty="0" smtClean="0"/>
@@ -7022,13 +6548,8 @@
             </a:r>
             <a:r>
               <a:rPr lang="fr-FR" dirty="0" smtClean="0"/>
-              <a:t>Editeur : </a:t>
-            </a:r>
-            <a:r>
-              <a:rPr lang="fr-FR" dirty="0" err="1" smtClean="0"/>
-              <a:t>Xxxxx</a:t>
-            </a:r>
-            <a:endParaRPr lang="fr-FR" dirty="0" smtClean="0"/>
+              <a:t>Editeur : Xxxxx</a:t>
+            </a:r>
           </a:p>
         </p:txBody>
       </p:sp>
@@ -7090,7 +6611,7 @@
             <a:lstStyle/>
             <a:p>
               <a:pPr algn="ctr"/>
-              <a:endParaRPr lang="fr-FR"/>
+              <a:endParaRPr lang="fr-FR" dirty="0"/>
             </a:p>
           </p:txBody>
         </p:sp>
@@ -7341,12 +6862,8 @@
               <a:t>Genre : </a:t>
             </a:r>
             <a:r>
-              <a:rPr lang="fr-FR" i="1" dirty="0" err="1" smtClean="0"/>
-              <a:t>Xxxx</a:t>
-            </a:r>
-            <a:r>
               <a:rPr lang="fr-FR" i="1" dirty="0" smtClean="0"/>
-              <a:t>			</a:t>
+              <a:t>Xxxx			</a:t>
             </a:r>
             <a:r>
               <a:rPr lang="fr-FR" dirty="0" smtClean="0"/>
@@ -7368,13 +6885,8 @@
             </a:r>
             <a:r>
               <a:rPr lang="fr-FR" dirty="0" smtClean="0"/>
-              <a:t>Editeur : </a:t>
-            </a:r>
-            <a:r>
-              <a:rPr lang="fr-FR" dirty="0" err="1" smtClean="0"/>
-              <a:t>Xxxxx</a:t>
-            </a:r>
-            <a:endParaRPr lang="fr-FR" dirty="0" smtClean="0"/>
+              <a:t>Editeur : Xxxxx</a:t>
+            </a:r>
           </a:p>
         </p:txBody>
       </p:sp>
@@ -7436,7 +6948,7 @@
             <a:lstStyle/>
             <a:p>
               <a:pPr algn="ctr"/>
-              <a:endParaRPr lang="fr-FR"/>
+              <a:endParaRPr lang="fr-FR" dirty="0"/>
             </a:p>
           </p:txBody>
         </p:sp>
@@ -8240,7 +7752,7 @@
           <a:lstStyle/>
           <a:p>
             <a:pPr algn="ctr"/>
-            <a:endParaRPr lang="fr-FR"/>
+            <a:endParaRPr lang="fr-FR" dirty="0"/>
           </a:p>
         </p:txBody>
       </p:sp>
@@ -8283,7 +7795,7 @@
           <a:lstStyle/>
           <a:p>
             <a:pPr algn="ctr"/>
-            <a:endParaRPr lang="fr-FR"/>
+            <a:endParaRPr lang="fr-FR" dirty="0"/>
           </a:p>
         </p:txBody>
       </p:sp>
@@ -8326,7 +7838,7 @@
           <a:lstStyle/>
           <a:p>
             <a:pPr algn="ctr"/>
-            <a:endParaRPr lang="fr-FR"/>
+            <a:endParaRPr lang="fr-FR" dirty="0"/>
           </a:p>
         </p:txBody>
       </p:sp>
@@ -8369,7 +7881,7 @@
           <a:lstStyle/>
           <a:p>
             <a:pPr algn="ctr"/>
-            <a:endParaRPr lang="fr-FR"/>
+            <a:endParaRPr lang="fr-FR" dirty="0"/>
           </a:p>
         </p:txBody>
       </p:sp>
@@ -8412,7 +7924,7 @@
           <a:lstStyle/>
           <a:p>
             <a:pPr algn="ctr"/>
-            <a:endParaRPr lang="fr-FR"/>
+            <a:endParaRPr lang="fr-FR" dirty="0"/>
           </a:p>
         </p:txBody>
       </p:sp>

</xml_diff>